<commit_message>
att front e ptt
</commit_message>
<xml_diff>
--- a/Documentação/PPT-jobby-Jobs-sprint-03.pptx
+++ b/Documentação/PPT-jobby-Jobs-sprint-03.pptx
@@ -8,13 +8,17 @@
     <p:sldId id="256" r:id="rId2"/>
     <p:sldId id="257" r:id="rId3"/>
     <p:sldId id="258" r:id="rId4"/>
-    <p:sldId id="259" r:id="rId5"/>
-    <p:sldId id="264" r:id="rId6"/>
-    <p:sldId id="260" r:id="rId7"/>
-    <p:sldId id="261" r:id="rId8"/>
-    <p:sldId id="263" r:id="rId9"/>
-    <p:sldId id="262" r:id="rId10"/>
-    <p:sldId id="265" r:id="rId11"/>
+    <p:sldId id="266" r:id="rId5"/>
+    <p:sldId id="267" r:id="rId6"/>
+    <p:sldId id="259" r:id="rId7"/>
+    <p:sldId id="264" r:id="rId8"/>
+    <p:sldId id="260" r:id="rId9"/>
+    <p:sldId id="261" r:id="rId10"/>
+    <p:sldId id="268" r:id="rId11"/>
+    <p:sldId id="269" r:id="rId12"/>
+    <p:sldId id="263" r:id="rId13"/>
+    <p:sldId id="262" r:id="rId14"/>
+    <p:sldId id="265" r:id="rId15"/>
   </p:sldIdLst>
   <p:sldSz cx="12192000" cy="6858000"/>
   <p:notesSz cx="6858000" cy="9144000"/>
@@ -113,6 +117,11 @@
       </a:defRPr>
     </a:lvl9pPr>
   </p:defaultTextStyle>
+  <p:extLst>
+    <p:ext uri="{EFAFB233-063F-42B5-8137-9DF3F51BA10A}">
+      <p15:sldGuideLst xmlns:p15="http://schemas.microsoft.com/office/powerpoint/2012/main"/>
+    </p:ext>
+  </p:extLst>
 </p:presentation>
 </file>
 
@@ -263,7 +272,7 @@
           <a:p>
             <a:fld id="{DA82CFBC-483E-415B-811C-BCF29C6DCBA9}" type="datetimeFigureOut">
               <a:rPr lang="pt-BR" smtClean="0"/>
-              <a:t>08/12/2020</a:t>
+              <a:t>14/12/2020</a:t>
             </a:fld>
             <a:endParaRPr lang="pt-BR"/>
           </a:p>
@@ -461,7 +470,7 @@
           <a:p>
             <a:fld id="{DA82CFBC-483E-415B-811C-BCF29C6DCBA9}" type="datetimeFigureOut">
               <a:rPr lang="pt-BR" smtClean="0"/>
-              <a:t>08/12/2020</a:t>
+              <a:t>14/12/2020</a:t>
             </a:fld>
             <a:endParaRPr lang="pt-BR"/>
           </a:p>
@@ -669,7 +678,7 @@
           <a:p>
             <a:fld id="{DA82CFBC-483E-415B-811C-BCF29C6DCBA9}" type="datetimeFigureOut">
               <a:rPr lang="pt-BR" smtClean="0"/>
-              <a:t>08/12/2020</a:t>
+              <a:t>14/12/2020</a:t>
             </a:fld>
             <a:endParaRPr lang="pt-BR"/>
           </a:p>
@@ -867,7 +876,7 @@
           <a:p>
             <a:fld id="{DA82CFBC-483E-415B-811C-BCF29C6DCBA9}" type="datetimeFigureOut">
               <a:rPr lang="pt-BR" smtClean="0"/>
-              <a:t>08/12/2020</a:t>
+              <a:t>14/12/2020</a:t>
             </a:fld>
             <a:endParaRPr lang="pt-BR"/>
           </a:p>
@@ -1142,7 +1151,7 @@
           <a:p>
             <a:fld id="{DA82CFBC-483E-415B-811C-BCF29C6DCBA9}" type="datetimeFigureOut">
               <a:rPr lang="pt-BR" smtClean="0"/>
-              <a:t>08/12/2020</a:t>
+              <a:t>14/12/2020</a:t>
             </a:fld>
             <a:endParaRPr lang="pt-BR"/>
           </a:p>
@@ -1407,7 +1416,7 @@
           <a:p>
             <a:fld id="{DA82CFBC-483E-415B-811C-BCF29C6DCBA9}" type="datetimeFigureOut">
               <a:rPr lang="pt-BR" smtClean="0"/>
-              <a:t>08/12/2020</a:t>
+              <a:t>14/12/2020</a:t>
             </a:fld>
             <a:endParaRPr lang="pt-BR"/>
           </a:p>
@@ -1819,7 +1828,7 @@
           <a:p>
             <a:fld id="{DA82CFBC-483E-415B-811C-BCF29C6DCBA9}" type="datetimeFigureOut">
               <a:rPr lang="pt-BR" smtClean="0"/>
-              <a:t>08/12/2020</a:t>
+              <a:t>14/12/2020</a:t>
             </a:fld>
             <a:endParaRPr lang="pt-BR"/>
           </a:p>
@@ -1960,7 +1969,7 @@
           <a:p>
             <a:fld id="{DA82CFBC-483E-415B-811C-BCF29C6DCBA9}" type="datetimeFigureOut">
               <a:rPr lang="pt-BR" smtClean="0"/>
-              <a:t>08/12/2020</a:t>
+              <a:t>14/12/2020</a:t>
             </a:fld>
             <a:endParaRPr lang="pt-BR"/>
           </a:p>
@@ -2073,7 +2082,7 @@
           <a:p>
             <a:fld id="{DA82CFBC-483E-415B-811C-BCF29C6DCBA9}" type="datetimeFigureOut">
               <a:rPr lang="pt-BR" smtClean="0"/>
-              <a:t>08/12/2020</a:t>
+              <a:t>14/12/2020</a:t>
             </a:fld>
             <a:endParaRPr lang="pt-BR"/>
           </a:p>
@@ -2384,7 +2393,7 @@
           <a:p>
             <a:fld id="{DA82CFBC-483E-415B-811C-BCF29C6DCBA9}" type="datetimeFigureOut">
               <a:rPr lang="pt-BR" smtClean="0"/>
-              <a:t>08/12/2020</a:t>
+              <a:t>14/12/2020</a:t>
             </a:fld>
             <a:endParaRPr lang="pt-BR"/>
           </a:p>
@@ -2672,7 +2681,7 @@
           <a:p>
             <a:fld id="{DA82CFBC-483E-415B-811C-BCF29C6DCBA9}" type="datetimeFigureOut">
               <a:rPr lang="pt-BR" smtClean="0"/>
-              <a:t>08/12/2020</a:t>
+              <a:t>14/12/2020</a:t>
             </a:fld>
             <a:endParaRPr lang="pt-BR"/>
           </a:p>
@@ -2913,7 +2922,7 @@
           <a:p>
             <a:fld id="{DA82CFBC-483E-415B-811C-BCF29C6DCBA9}" type="datetimeFigureOut">
               <a:rPr lang="pt-BR" smtClean="0"/>
-              <a:t>08/12/2020</a:t>
+              <a:t>14/12/2020</a:t>
             </a:fld>
             <a:endParaRPr lang="pt-BR"/>
           </a:p>
@@ -3432,6 +3441,858 @@
 <file path=ppt/slides/slide10.xml><?xml version="1.0" encoding="utf-8"?>
 <p:sld xmlns:a="http://schemas.openxmlformats.org/drawingml/2006/main" xmlns:r="http://schemas.openxmlformats.org/officeDocument/2006/relationships" xmlns:p="http://schemas.openxmlformats.org/presentationml/2006/main">
   <p:cSld>
+    <p:bg>
+      <p:bgPr>
+        <a:solidFill>
+          <a:schemeClr val="bg1"/>
+        </a:solidFill>
+        <a:effectLst/>
+      </p:bgPr>
+    </p:bg>
+    <p:spTree>
+      <p:nvGrpSpPr>
+        <p:cNvPr id="1" name=""/>
+        <p:cNvGrpSpPr/>
+        <p:nvPr/>
+      </p:nvGrpSpPr>
+      <p:grpSpPr>
+        <a:xfrm>
+          <a:off x="0" y="0"/>
+          <a:ext cx="0" cy="0"/>
+          <a:chOff x="0" y="0"/>
+          <a:chExt cx="0" cy="0"/>
+        </a:xfrm>
+      </p:grpSpPr>
+      <p:sp>
+        <p:nvSpPr>
+          <p:cNvPr id="10" name="Rectangle 9">
+            <a:extLst>
+              <a:ext uri="{FF2B5EF4-FFF2-40B4-BE49-F238E27FC236}">
+                <a16:creationId xmlns:a16="http://schemas.microsoft.com/office/drawing/2014/main" id="{42A4FC2C-047E-45A5-965D-8E1E3BF09BC6}"/>
+              </a:ext>
+              <a:ext uri="{C183D7F6-B498-43B3-948B-1728B52AA6E4}">
+                <adec:decorative xmlns:adec="http://schemas.microsoft.com/office/drawing/2017/decorative" val="1"/>
+              </a:ext>
+            </a:extLst>
+          </p:cNvPr>
+          <p:cNvSpPr>
+            <a:spLocks noGrp="1" noRot="1" noChangeAspect="1" noMove="1" noResize="1" noEditPoints="1" noAdjustHandles="1" noChangeArrowheads="1" noChangeShapeType="1" noTextEdit="1"/>
+          </p:cNvSpPr>
+          <p:nvPr>
+            <p:extLst>
+              <p:ext uri="{386F3935-93C4-4BCD-93E2-E3B085C9AB24}">
+                <p16:designElem xmlns:p16="http://schemas.microsoft.com/office/powerpoint/2015/main" val="1"/>
+              </p:ext>
+            </p:extLst>
+          </p:nvPr>
+        </p:nvSpPr>
+        <p:spPr bwMode="white">
+          <a:xfrm>
+            <a:off x="1524" y="0"/>
+            <a:ext cx="12188952" cy="6858000"/>
+          </a:xfrm>
+          <a:prstGeom prst="rect">
+            <a:avLst/>
+          </a:prstGeom>
+          <a:noFill/>
+          <a:ln>
+            <a:noFill/>
+          </a:ln>
+        </p:spPr>
+        <p:style>
+          <a:lnRef idx="2">
+            <a:schemeClr val="accent1">
+              <a:shade val="50000"/>
+            </a:schemeClr>
+          </a:lnRef>
+          <a:fillRef idx="1">
+            <a:schemeClr val="accent1"/>
+          </a:fillRef>
+          <a:effectRef idx="0">
+            <a:schemeClr val="accent1"/>
+          </a:effectRef>
+          <a:fontRef idx="minor">
+            <a:schemeClr val="lt1"/>
+          </a:fontRef>
+        </p:style>
+        <p:txBody>
+          <a:bodyPr rtlCol="0" anchor="ctr"/>
+          <a:lstStyle>
+            <a:defPPr>
+              <a:defRPr lang="en-US"/>
+            </a:defPPr>
+            <a:lvl1pPr marL="0" algn="l" defTabSz="914400" rtl="0" eaLnBrk="1" latinLnBrk="0" hangingPunct="1">
+              <a:defRPr sz="1800" kern="1200">
+                <a:solidFill>
+                  <a:schemeClr val="lt1"/>
+                </a:solidFill>
+                <a:latin typeface="+mn-lt"/>
+                <a:ea typeface="+mn-ea"/>
+                <a:cs typeface="+mn-cs"/>
+              </a:defRPr>
+            </a:lvl1pPr>
+            <a:lvl2pPr marL="457200" algn="l" defTabSz="914400" rtl="0" eaLnBrk="1" latinLnBrk="0" hangingPunct="1">
+              <a:defRPr sz="1800" kern="1200">
+                <a:solidFill>
+                  <a:schemeClr val="lt1"/>
+                </a:solidFill>
+                <a:latin typeface="+mn-lt"/>
+                <a:ea typeface="+mn-ea"/>
+                <a:cs typeface="+mn-cs"/>
+              </a:defRPr>
+            </a:lvl2pPr>
+            <a:lvl3pPr marL="914400" algn="l" defTabSz="914400" rtl="0" eaLnBrk="1" latinLnBrk="0" hangingPunct="1">
+              <a:defRPr sz="1800" kern="1200">
+                <a:solidFill>
+                  <a:schemeClr val="lt1"/>
+                </a:solidFill>
+                <a:latin typeface="+mn-lt"/>
+                <a:ea typeface="+mn-ea"/>
+                <a:cs typeface="+mn-cs"/>
+              </a:defRPr>
+            </a:lvl3pPr>
+            <a:lvl4pPr marL="1371600" algn="l" defTabSz="914400" rtl="0" eaLnBrk="1" latinLnBrk="0" hangingPunct="1">
+              <a:defRPr sz="1800" kern="1200">
+                <a:solidFill>
+                  <a:schemeClr val="lt1"/>
+                </a:solidFill>
+                <a:latin typeface="+mn-lt"/>
+                <a:ea typeface="+mn-ea"/>
+                <a:cs typeface="+mn-cs"/>
+              </a:defRPr>
+            </a:lvl4pPr>
+            <a:lvl5pPr marL="1828800" algn="l" defTabSz="914400" rtl="0" eaLnBrk="1" latinLnBrk="0" hangingPunct="1">
+              <a:defRPr sz="1800" kern="1200">
+                <a:solidFill>
+                  <a:schemeClr val="lt1"/>
+                </a:solidFill>
+                <a:latin typeface="+mn-lt"/>
+                <a:ea typeface="+mn-ea"/>
+                <a:cs typeface="+mn-cs"/>
+              </a:defRPr>
+            </a:lvl5pPr>
+            <a:lvl6pPr marL="2286000" algn="l" defTabSz="914400" rtl="0" eaLnBrk="1" latinLnBrk="0" hangingPunct="1">
+              <a:defRPr sz="1800" kern="1200">
+                <a:solidFill>
+                  <a:schemeClr val="lt1"/>
+                </a:solidFill>
+                <a:latin typeface="+mn-lt"/>
+                <a:ea typeface="+mn-ea"/>
+                <a:cs typeface="+mn-cs"/>
+              </a:defRPr>
+            </a:lvl6pPr>
+            <a:lvl7pPr marL="2743200" algn="l" defTabSz="914400" rtl="0" eaLnBrk="1" latinLnBrk="0" hangingPunct="1">
+              <a:defRPr sz="1800" kern="1200">
+                <a:solidFill>
+                  <a:schemeClr val="lt1"/>
+                </a:solidFill>
+                <a:latin typeface="+mn-lt"/>
+                <a:ea typeface="+mn-ea"/>
+                <a:cs typeface="+mn-cs"/>
+              </a:defRPr>
+            </a:lvl7pPr>
+            <a:lvl8pPr marL="3200400" algn="l" defTabSz="914400" rtl="0" eaLnBrk="1" latinLnBrk="0" hangingPunct="1">
+              <a:defRPr sz="1800" kern="1200">
+                <a:solidFill>
+                  <a:schemeClr val="lt1"/>
+                </a:solidFill>
+                <a:latin typeface="+mn-lt"/>
+                <a:ea typeface="+mn-ea"/>
+                <a:cs typeface="+mn-cs"/>
+              </a:defRPr>
+            </a:lvl8pPr>
+            <a:lvl9pPr marL="3657600" algn="l" defTabSz="914400" rtl="0" eaLnBrk="1" latinLnBrk="0" hangingPunct="1">
+              <a:defRPr sz="1800" kern="1200">
+                <a:solidFill>
+                  <a:schemeClr val="lt1"/>
+                </a:solidFill>
+                <a:latin typeface="+mn-lt"/>
+                <a:ea typeface="+mn-ea"/>
+                <a:cs typeface="+mn-cs"/>
+              </a:defRPr>
+            </a:lvl9pPr>
+          </a:lstStyle>
+          <a:p>
+            <a:pPr algn="ctr"/>
+            <a:endParaRPr lang="en-US"/>
+          </a:p>
+        </p:txBody>
+      </p:sp>
+      <p:pic>
+        <p:nvPicPr>
+          <p:cNvPr id="5" name="Espaço Reservado para Conteúdo 4" descr="Uma imagem contendo Logotipo&#10;&#10;Descrição gerada automaticamente">
+            <a:extLst>
+              <a:ext uri="{FF2B5EF4-FFF2-40B4-BE49-F238E27FC236}">
+                <a16:creationId xmlns:a16="http://schemas.microsoft.com/office/drawing/2014/main" id="{4D2BF425-43A8-4379-B140-90CA03DB856F}"/>
+              </a:ext>
+            </a:extLst>
+          </p:cNvPr>
+          <p:cNvPicPr>
+            <a:picLocks noGrp="1" noChangeAspect="1"/>
+          </p:cNvPicPr>
+          <p:nvPr>
+            <p:ph idx="1"/>
+          </p:nvPr>
+        </p:nvPicPr>
+        <p:blipFill rotWithShape="1">
+          <a:blip r:embed="rId2">
+            <a:extLst>
+              <a:ext uri="{28A0092B-C50C-407E-A947-70E740481C1C}">
+                <a14:useLocalDpi xmlns:a14="http://schemas.microsoft.com/office/drawing/2010/main" val="0"/>
+              </a:ext>
+            </a:extLst>
+          </a:blip>
+          <a:srcRect b="19"/>
+          <a:stretch/>
+        </p:blipFill>
+        <p:spPr>
+          <a:xfrm>
+            <a:off x="20" y="1282"/>
+            <a:ext cx="12191980" cy="6856718"/>
+          </a:xfrm>
+          <a:prstGeom prst="rect">
+            <a:avLst/>
+          </a:prstGeom>
+        </p:spPr>
+      </p:pic>
+      <p:pic>
+        <p:nvPicPr>
+          <p:cNvPr id="7" name="Imagem 6" descr="Diagrama&#10;&#10;Descrição gerada automaticamente">
+            <a:extLst>
+              <a:ext uri="{FF2B5EF4-FFF2-40B4-BE49-F238E27FC236}">
+                <a16:creationId xmlns:a16="http://schemas.microsoft.com/office/drawing/2014/main" id="{E6CC811A-EE0A-43C4-ACE7-E78ACAF64F92}"/>
+              </a:ext>
+            </a:extLst>
+          </p:cNvPr>
+          <p:cNvPicPr>
+            <a:picLocks noChangeAspect="1"/>
+          </p:cNvPicPr>
+          <p:nvPr/>
+        </p:nvPicPr>
+        <p:blipFill>
+          <a:blip r:embed="rId3">
+            <a:extLst>
+              <a:ext uri="{28A0092B-C50C-407E-A947-70E740481C1C}">
+                <a14:useLocalDpi xmlns:a14="http://schemas.microsoft.com/office/drawing/2010/main" val="0"/>
+              </a:ext>
+            </a:extLst>
+          </a:blip>
+          <a:stretch>
+            <a:fillRect/>
+          </a:stretch>
+        </p:blipFill>
+        <p:spPr>
+          <a:xfrm>
+            <a:off x="2925823" y="2025747"/>
+            <a:ext cx="6340353" cy="4508695"/>
+          </a:xfrm>
+          <a:prstGeom prst="rect">
+            <a:avLst/>
+          </a:prstGeom>
+        </p:spPr>
+      </p:pic>
+    </p:spTree>
+    <p:extLst>
+      <p:ext uri="{BB962C8B-B14F-4D97-AF65-F5344CB8AC3E}">
+        <p14:creationId xmlns:p14="http://schemas.microsoft.com/office/powerpoint/2010/main" val="2303131794"/>
+      </p:ext>
+    </p:extLst>
+  </p:cSld>
+  <p:clrMapOvr>
+    <a:masterClrMapping/>
+  </p:clrMapOvr>
+</p:sld>
+</file>
+
+<file path=ppt/slides/slide11.xml><?xml version="1.0" encoding="utf-8"?>
+<p:sld xmlns:a="http://schemas.openxmlformats.org/drawingml/2006/main" xmlns:r="http://schemas.openxmlformats.org/officeDocument/2006/relationships" xmlns:p="http://schemas.openxmlformats.org/presentationml/2006/main">
+  <p:cSld>
+    <p:bg>
+      <p:bgPr>
+        <a:solidFill>
+          <a:schemeClr val="bg1"/>
+        </a:solidFill>
+        <a:effectLst/>
+      </p:bgPr>
+    </p:bg>
+    <p:spTree>
+      <p:nvGrpSpPr>
+        <p:cNvPr id="1" name=""/>
+        <p:cNvGrpSpPr/>
+        <p:nvPr/>
+      </p:nvGrpSpPr>
+      <p:grpSpPr>
+        <a:xfrm>
+          <a:off x="0" y="0"/>
+          <a:ext cx="0" cy="0"/>
+          <a:chOff x="0" y="0"/>
+          <a:chExt cx="0" cy="0"/>
+        </a:xfrm>
+      </p:grpSpPr>
+      <p:sp>
+        <p:nvSpPr>
+          <p:cNvPr id="10" name="Rectangle 9">
+            <a:extLst>
+              <a:ext uri="{FF2B5EF4-FFF2-40B4-BE49-F238E27FC236}">
+                <a16:creationId xmlns:a16="http://schemas.microsoft.com/office/drawing/2014/main" id="{42A4FC2C-047E-45A5-965D-8E1E3BF09BC6}"/>
+              </a:ext>
+              <a:ext uri="{C183D7F6-B498-43B3-948B-1728B52AA6E4}">
+                <adec:decorative xmlns:adec="http://schemas.microsoft.com/office/drawing/2017/decorative" val="1"/>
+              </a:ext>
+            </a:extLst>
+          </p:cNvPr>
+          <p:cNvSpPr>
+            <a:spLocks noGrp="1" noRot="1" noChangeAspect="1" noMove="1" noResize="1" noEditPoints="1" noAdjustHandles="1" noChangeArrowheads="1" noChangeShapeType="1" noTextEdit="1"/>
+          </p:cNvSpPr>
+          <p:nvPr>
+            <p:extLst>
+              <p:ext uri="{386F3935-93C4-4BCD-93E2-E3B085C9AB24}">
+                <p16:designElem xmlns:p16="http://schemas.microsoft.com/office/powerpoint/2015/main" val="1"/>
+              </p:ext>
+            </p:extLst>
+          </p:nvPr>
+        </p:nvSpPr>
+        <p:spPr bwMode="white">
+          <a:xfrm>
+            <a:off x="1524" y="0"/>
+            <a:ext cx="12188952" cy="6858000"/>
+          </a:xfrm>
+          <a:prstGeom prst="rect">
+            <a:avLst/>
+          </a:prstGeom>
+          <a:noFill/>
+          <a:ln>
+            <a:noFill/>
+          </a:ln>
+        </p:spPr>
+        <p:style>
+          <a:lnRef idx="2">
+            <a:schemeClr val="accent1">
+              <a:shade val="50000"/>
+            </a:schemeClr>
+          </a:lnRef>
+          <a:fillRef idx="1">
+            <a:schemeClr val="accent1"/>
+          </a:fillRef>
+          <a:effectRef idx="0">
+            <a:schemeClr val="accent1"/>
+          </a:effectRef>
+          <a:fontRef idx="minor">
+            <a:schemeClr val="lt1"/>
+          </a:fontRef>
+        </p:style>
+        <p:txBody>
+          <a:bodyPr rtlCol="0" anchor="ctr"/>
+          <a:lstStyle>
+            <a:defPPr>
+              <a:defRPr lang="en-US"/>
+            </a:defPPr>
+            <a:lvl1pPr marL="0" algn="l" defTabSz="914400" rtl="0" eaLnBrk="1" latinLnBrk="0" hangingPunct="1">
+              <a:defRPr sz="1800" kern="1200">
+                <a:solidFill>
+                  <a:schemeClr val="lt1"/>
+                </a:solidFill>
+                <a:latin typeface="+mn-lt"/>
+                <a:ea typeface="+mn-ea"/>
+                <a:cs typeface="+mn-cs"/>
+              </a:defRPr>
+            </a:lvl1pPr>
+            <a:lvl2pPr marL="457200" algn="l" defTabSz="914400" rtl="0" eaLnBrk="1" latinLnBrk="0" hangingPunct="1">
+              <a:defRPr sz="1800" kern="1200">
+                <a:solidFill>
+                  <a:schemeClr val="lt1"/>
+                </a:solidFill>
+                <a:latin typeface="+mn-lt"/>
+                <a:ea typeface="+mn-ea"/>
+                <a:cs typeface="+mn-cs"/>
+              </a:defRPr>
+            </a:lvl2pPr>
+            <a:lvl3pPr marL="914400" algn="l" defTabSz="914400" rtl="0" eaLnBrk="1" latinLnBrk="0" hangingPunct="1">
+              <a:defRPr sz="1800" kern="1200">
+                <a:solidFill>
+                  <a:schemeClr val="lt1"/>
+                </a:solidFill>
+                <a:latin typeface="+mn-lt"/>
+                <a:ea typeface="+mn-ea"/>
+                <a:cs typeface="+mn-cs"/>
+              </a:defRPr>
+            </a:lvl3pPr>
+            <a:lvl4pPr marL="1371600" algn="l" defTabSz="914400" rtl="0" eaLnBrk="1" latinLnBrk="0" hangingPunct="1">
+              <a:defRPr sz="1800" kern="1200">
+                <a:solidFill>
+                  <a:schemeClr val="lt1"/>
+                </a:solidFill>
+                <a:latin typeface="+mn-lt"/>
+                <a:ea typeface="+mn-ea"/>
+                <a:cs typeface="+mn-cs"/>
+              </a:defRPr>
+            </a:lvl4pPr>
+            <a:lvl5pPr marL="1828800" algn="l" defTabSz="914400" rtl="0" eaLnBrk="1" latinLnBrk="0" hangingPunct="1">
+              <a:defRPr sz="1800" kern="1200">
+                <a:solidFill>
+                  <a:schemeClr val="lt1"/>
+                </a:solidFill>
+                <a:latin typeface="+mn-lt"/>
+                <a:ea typeface="+mn-ea"/>
+                <a:cs typeface="+mn-cs"/>
+              </a:defRPr>
+            </a:lvl5pPr>
+            <a:lvl6pPr marL="2286000" algn="l" defTabSz="914400" rtl="0" eaLnBrk="1" latinLnBrk="0" hangingPunct="1">
+              <a:defRPr sz="1800" kern="1200">
+                <a:solidFill>
+                  <a:schemeClr val="lt1"/>
+                </a:solidFill>
+                <a:latin typeface="+mn-lt"/>
+                <a:ea typeface="+mn-ea"/>
+                <a:cs typeface="+mn-cs"/>
+              </a:defRPr>
+            </a:lvl6pPr>
+            <a:lvl7pPr marL="2743200" algn="l" defTabSz="914400" rtl="0" eaLnBrk="1" latinLnBrk="0" hangingPunct="1">
+              <a:defRPr sz="1800" kern="1200">
+                <a:solidFill>
+                  <a:schemeClr val="lt1"/>
+                </a:solidFill>
+                <a:latin typeface="+mn-lt"/>
+                <a:ea typeface="+mn-ea"/>
+                <a:cs typeface="+mn-cs"/>
+              </a:defRPr>
+            </a:lvl7pPr>
+            <a:lvl8pPr marL="3200400" algn="l" defTabSz="914400" rtl="0" eaLnBrk="1" latinLnBrk="0" hangingPunct="1">
+              <a:defRPr sz="1800" kern="1200">
+                <a:solidFill>
+                  <a:schemeClr val="lt1"/>
+                </a:solidFill>
+                <a:latin typeface="+mn-lt"/>
+                <a:ea typeface="+mn-ea"/>
+                <a:cs typeface="+mn-cs"/>
+              </a:defRPr>
+            </a:lvl8pPr>
+            <a:lvl9pPr marL="3657600" algn="l" defTabSz="914400" rtl="0" eaLnBrk="1" latinLnBrk="0" hangingPunct="1">
+              <a:defRPr sz="1800" kern="1200">
+                <a:solidFill>
+                  <a:schemeClr val="lt1"/>
+                </a:solidFill>
+                <a:latin typeface="+mn-lt"/>
+                <a:ea typeface="+mn-ea"/>
+                <a:cs typeface="+mn-cs"/>
+              </a:defRPr>
+            </a:lvl9pPr>
+          </a:lstStyle>
+          <a:p>
+            <a:pPr algn="ctr"/>
+            <a:endParaRPr lang="en-US"/>
+          </a:p>
+        </p:txBody>
+      </p:sp>
+      <p:pic>
+        <p:nvPicPr>
+          <p:cNvPr id="5" name="Espaço Reservado para Conteúdo 4" descr="Uma imagem contendo Logotipo&#10;&#10;Descrição gerada automaticamente">
+            <a:extLst>
+              <a:ext uri="{FF2B5EF4-FFF2-40B4-BE49-F238E27FC236}">
+                <a16:creationId xmlns:a16="http://schemas.microsoft.com/office/drawing/2014/main" id="{4D2BF425-43A8-4379-B140-90CA03DB856F}"/>
+              </a:ext>
+            </a:extLst>
+          </p:cNvPr>
+          <p:cNvPicPr>
+            <a:picLocks noGrp="1" noChangeAspect="1"/>
+          </p:cNvPicPr>
+          <p:nvPr>
+            <p:ph idx="1"/>
+          </p:nvPr>
+        </p:nvPicPr>
+        <p:blipFill rotWithShape="1">
+          <a:blip r:embed="rId2">
+            <a:extLst>
+              <a:ext uri="{28A0092B-C50C-407E-A947-70E740481C1C}">
+                <a14:useLocalDpi xmlns:a14="http://schemas.microsoft.com/office/drawing/2010/main" val="0"/>
+              </a:ext>
+            </a:extLst>
+          </a:blip>
+          <a:srcRect b="19"/>
+          <a:stretch/>
+        </p:blipFill>
+        <p:spPr>
+          <a:xfrm>
+            <a:off x="20" y="1282"/>
+            <a:ext cx="12191980" cy="6856718"/>
+          </a:xfrm>
+          <a:prstGeom prst="rect">
+            <a:avLst/>
+          </a:prstGeom>
+        </p:spPr>
+      </p:pic>
+      <p:pic>
+        <p:nvPicPr>
+          <p:cNvPr id="3" name="Imagem 2" descr="Diagrama&#10;&#10;Descrição gerada automaticamente">
+            <a:extLst>
+              <a:ext uri="{FF2B5EF4-FFF2-40B4-BE49-F238E27FC236}">
+                <a16:creationId xmlns:a16="http://schemas.microsoft.com/office/drawing/2014/main" id="{1CD5CB85-F834-41C9-928D-B928268B27D6}"/>
+              </a:ext>
+            </a:extLst>
+          </p:cNvPr>
+          <p:cNvPicPr>
+            <a:picLocks noChangeAspect="1"/>
+          </p:cNvPicPr>
+          <p:nvPr/>
+        </p:nvPicPr>
+        <p:blipFill>
+          <a:blip r:embed="rId3">
+            <a:extLst>
+              <a:ext uri="{28A0092B-C50C-407E-A947-70E740481C1C}">
+                <a14:useLocalDpi xmlns:a14="http://schemas.microsoft.com/office/drawing/2010/main" val="0"/>
+              </a:ext>
+            </a:extLst>
+          </a:blip>
+          <a:stretch>
+            <a:fillRect/>
+          </a:stretch>
+        </p:blipFill>
+        <p:spPr>
+          <a:xfrm>
+            <a:off x="2660387" y="1817050"/>
+            <a:ext cx="6871226" cy="4886205"/>
+          </a:xfrm>
+          <a:prstGeom prst="rect">
+            <a:avLst/>
+          </a:prstGeom>
+        </p:spPr>
+      </p:pic>
+    </p:spTree>
+    <p:extLst>
+      <p:ext uri="{BB962C8B-B14F-4D97-AF65-F5344CB8AC3E}">
+        <p14:creationId xmlns:p14="http://schemas.microsoft.com/office/powerpoint/2010/main" val="3655824886"/>
+      </p:ext>
+    </p:extLst>
+  </p:cSld>
+  <p:clrMapOvr>
+    <a:masterClrMapping/>
+  </p:clrMapOvr>
+</p:sld>
+</file>
+
+<file path=ppt/slides/slide12.xml><?xml version="1.0" encoding="utf-8"?>
+<p:sld xmlns:a="http://schemas.openxmlformats.org/drawingml/2006/main" xmlns:r="http://schemas.openxmlformats.org/officeDocument/2006/relationships" xmlns:p="http://schemas.openxmlformats.org/presentationml/2006/main">
+  <p:cSld>
+    <p:bg>
+      <p:bgPr>
+        <a:solidFill>
+          <a:schemeClr val="bg1"/>
+        </a:solidFill>
+        <a:effectLst/>
+      </p:bgPr>
+    </p:bg>
+    <p:spTree>
+      <p:nvGrpSpPr>
+        <p:cNvPr id="1" name=""/>
+        <p:cNvGrpSpPr/>
+        <p:nvPr/>
+      </p:nvGrpSpPr>
+      <p:grpSpPr>
+        <a:xfrm>
+          <a:off x="0" y="0"/>
+          <a:ext cx="0" cy="0"/>
+          <a:chOff x="0" y="0"/>
+          <a:chExt cx="0" cy="0"/>
+        </a:xfrm>
+      </p:grpSpPr>
+      <p:sp>
+        <p:nvSpPr>
+          <p:cNvPr id="12" name="Rectangle 11">
+            <a:extLst>
+              <a:ext uri="{FF2B5EF4-FFF2-40B4-BE49-F238E27FC236}">
+                <a16:creationId xmlns:a16="http://schemas.microsoft.com/office/drawing/2014/main" id="{42A4FC2C-047E-45A5-965D-8E1E3BF09BC6}"/>
+              </a:ext>
+              <a:ext uri="{C183D7F6-B498-43B3-948B-1728B52AA6E4}">
+                <adec:decorative xmlns:adec="http://schemas.microsoft.com/office/drawing/2017/decorative" val="1"/>
+              </a:ext>
+            </a:extLst>
+          </p:cNvPr>
+          <p:cNvSpPr>
+            <a:spLocks noGrp="1" noRot="1" noChangeAspect="1" noMove="1" noResize="1" noEditPoints="1" noAdjustHandles="1" noChangeArrowheads="1" noChangeShapeType="1" noTextEdit="1"/>
+          </p:cNvSpPr>
+          <p:nvPr>
+            <p:extLst>
+              <p:ext uri="{386F3935-93C4-4BCD-93E2-E3B085C9AB24}">
+                <p16:designElem xmlns:p16="http://schemas.microsoft.com/office/powerpoint/2015/main" val="1"/>
+              </p:ext>
+            </p:extLst>
+          </p:nvPr>
+        </p:nvSpPr>
+        <p:spPr bwMode="white">
+          <a:xfrm>
+            <a:off x="1524" y="0"/>
+            <a:ext cx="12188952" cy="6858000"/>
+          </a:xfrm>
+          <a:prstGeom prst="rect">
+            <a:avLst/>
+          </a:prstGeom>
+          <a:noFill/>
+          <a:ln>
+            <a:noFill/>
+          </a:ln>
+        </p:spPr>
+        <p:style>
+          <a:lnRef idx="2">
+            <a:schemeClr val="accent1">
+              <a:shade val="50000"/>
+            </a:schemeClr>
+          </a:lnRef>
+          <a:fillRef idx="1">
+            <a:schemeClr val="accent1"/>
+          </a:fillRef>
+          <a:effectRef idx="0">
+            <a:schemeClr val="accent1"/>
+          </a:effectRef>
+          <a:fontRef idx="minor">
+            <a:schemeClr val="lt1"/>
+          </a:fontRef>
+        </p:style>
+        <p:txBody>
+          <a:bodyPr rtlCol="0" anchor="ctr"/>
+          <a:lstStyle>
+            <a:defPPr>
+              <a:defRPr lang="en-US"/>
+            </a:defPPr>
+            <a:lvl1pPr marL="0" algn="l" defTabSz="914400" rtl="0" eaLnBrk="1" latinLnBrk="0" hangingPunct="1">
+              <a:defRPr sz="1800" kern="1200">
+                <a:solidFill>
+                  <a:schemeClr val="lt1"/>
+                </a:solidFill>
+                <a:latin typeface="+mn-lt"/>
+                <a:ea typeface="+mn-ea"/>
+                <a:cs typeface="+mn-cs"/>
+              </a:defRPr>
+            </a:lvl1pPr>
+            <a:lvl2pPr marL="457200" algn="l" defTabSz="914400" rtl="0" eaLnBrk="1" latinLnBrk="0" hangingPunct="1">
+              <a:defRPr sz="1800" kern="1200">
+                <a:solidFill>
+                  <a:schemeClr val="lt1"/>
+                </a:solidFill>
+                <a:latin typeface="+mn-lt"/>
+                <a:ea typeface="+mn-ea"/>
+                <a:cs typeface="+mn-cs"/>
+              </a:defRPr>
+            </a:lvl2pPr>
+            <a:lvl3pPr marL="914400" algn="l" defTabSz="914400" rtl="0" eaLnBrk="1" latinLnBrk="0" hangingPunct="1">
+              <a:defRPr sz="1800" kern="1200">
+                <a:solidFill>
+                  <a:schemeClr val="lt1"/>
+                </a:solidFill>
+                <a:latin typeface="+mn-lt"/>
+                <a:ea typeface="+mn-ea"/>
+                <a:cs typeface="+mn-cs"/>
+              </a:defRPr>
+            </a:lvl3pPr>
+            <a:lvl4pPr marL="1371600" algn="l" defTabSz="914400" rtl="0" eaLnBrk="1" latinLnBrk="0" hangingPunct="1">
+              <a:defRPr sz="1800" kern="1200">
+                <a:solidFill>
+                  <a:schemeClr val="lt1"/>
+                </a:solidFill>
+                <a:latin typeface="+mn-lt"/>
+                <a:ea typeface="+mn-ea"/>
+                <a:cs typeface="+mn-cs"/>
+              </a:defRPr>
+            </a:lvl4pPr>
+            <a:lvl5pPr marL="1828800" algn="l" defTabSz="914400" rtl="0" eaLnBrk="1" latinLnBrk="0" hangingPunct="1">
+              <a:defRPr sz="1800" kern="1200">
+                <a:solidFill>
+                  <a:schemeClr val="lt1"/>
+                </a:solidFill>
+                <a:latin typeface="+mn-lt"/>
+                <a:ea typeface="+mn-ea"/>
+                <a:cs typeface="+mn-cs"/>
+              </a:defRPr>
+            </a:lvl5pPr>
+            <a:lvl6pPr marL="2286000" algn="l" defTabSz="914400" rtl="0" eaLnBrk="1" latinLnBrk="0" hangingPunct="1">
+              <a:defRPr sz="1800" kern="1200">
+                <a:solidFill>
+                  <a:schemeClr val="lt1"/>
+                </a:solidFill>
+                <a:latin typeface="+mn-lt"/>
+                <a:ea typeface="+mn-ea"/>
+                <a:cs typeface="+mn-cs"/>
+              </a:defRPr>
+            </a:lvl6pPr>
+            <a:lvl7pPr marL="2743200" algn="l" defTabSz="914400" rtl="0" eaLnBrk="1" latinLnBrk="0" hangingPunct="1">
+              <a:defRPr sz="1800" kern="1200">
+                <a:solidFill>
+                  <a:schemeClr val="lt1"/>
+                </a:solidFill>
+                <a:latin typeface="+mn-lt"/>
+                <a:ea typeface="+mn-ea"/>
+                <a:cs typeface="+mn-cs"/>
+              </a:defRPr>
+            </a:lvl7pPr>
+            <a:lvl8pPr marL="3200400" algn="l" defTabSz="914400" rtl="0" eaLnBrk="1" latinLnBrk="0" hangingPunct="1">
+              <a:defRPr sz="1800" kern="1200">
+                <a:solidFill>
+                  <a:schemeClr val="lt1"/>
+                </a:solidFill>
+                <a:latin typeface="+mn-lt"/>
+                <a:ea typeface="+mn-ea"/>
+                <a:cs typeface="+mn-cs"/>
+              </a:defRPr>
+            </a:lvl8pPr>
+            <a:lvl9pPr marL="3657600" algn="l" defTabSz="914400" rtl="0" eaLnBrk="1" latinLnBrk="0" hangingPunct="1">
+              <a:defRPr sz="1800" kern="1200">
+                <a:solidFill>
+                  <a:schemeClr val="lt1"/>
+                </a:solidFill>
+                <a:latin typeface="+mn-lt"/>
+                <a:ea typeface="+mn-ea"/>
+                <a:cs typeface="+mn-cs"/>
+              </a:defRPr>
+            </a:lvl9pPr>
+          </a:lstStyle>
+          <a:p>
+            <a:pPr algn="ctr"/>
+            <a:endParaRPr lang="en-US"/>
+          </a:p>
+        </p:txBody>
+      </p:sp>
+      <p:pic>
+        <p:nvPicPr>
+          <p:cNvPr id="7" name="Espaço Reservado para Conteúdo 6" descr="Texto, Logotipo, nome da empresa&#10;&#10;Descrição gerada automaticamente">
+            <a:extLst>
+              <a:ext uri="{FF2B5EF4-FFF2-40B4-BE49-F238E27FC236}">
+                <a16:creationId xmlns:a16="http://schemas.microsoft.com/office/drawing/2014/main" id="{AB599C44-6795-412E-9E7F-D277FDBF2879}"/>
+              </a:ext>
+            </a:extLst>
+          </p:cNvPr>
+          <p:cNvPicPr>
+            <a:picLocks noGrp="1" noChangeAspect="1"/>
+          </p:cNvPicPr>
+          <p:nvPr>
+            <p:ph idx="1"/>
+          </p:nvPr>
+        </p:nvPicPr>
+        <p:blipFill rotWithShape="1">
+          <a:blip r:embed="rId2">
+            <a:extLst>
+              <a:ext uri="{28A0092B-C50C-407E-A947-70E740481C1C}">
+                <a14:useLocalDpi xmlns:a14="http://schemas.microsoft.com/office/drawing/2010/main" val="0"/>
+              </a:ext>
+            </a:extLst>
+          </a:blip>
+          <a:srcRect t="19"/>
+          <a:stretch/>
+        </p:blipFill>
+        <p:spPr>
+          <a:xfrm>
+            <a:off x="20" y="1282"/>
+            <a:ext cx="12191980" cy="6856718"/>
+          </a:xfrm>
+          <a:prstGeom prst="rect">
+            <a:avLst/>
+          </a:prstGeom>
+        </p:spPr>
+      </p:pic>
+    </p:spTree>
+    <p:extLst>
+      <p:ext uri="{BB962C8B-B14F-4D97-AF65-F5344CB8AC3E}">
+        <p14:creationId xmlns:p14="http://schemas.microsoft.com/office/powerpoint/2010/main" val="1187616082"/>
+      </p:ext>
+    </p:extLst>
+  </p:cSld>
+  <p:clrMapOvr>
+    <a:masterClrMapping/>
+  </p:clrMapOvr>
+</p:sld>
+</file>
+
+<file path=ppt/slides/slide13.xml><?xml version="1.0" encoding="utf-8"?>
+<p:sld xmlns:a="http://schemas.openxmlformats.org/drawingml/2006/main" xmlns:r="http://schemas.openxmlformats.org/officeDocument/2006/relationships" xmlns:p="http://schemas.openxmlformats.org/presentationml/2006/main">
+  <p:cSld>
+    <p:spTree>
+      <p:nvGrpSpPr>
+        <p:cNvPr id="1" name=""/>
+        <p:cNvGrpSpPr/>
+        <p:nvPr/>
+      </p:nvGrpSpPr>
+      <p:grpSpPr>
+        <a:xfrm>
+          <a:off x="0" y="0"/>
+          <a:ext cx="0" cy="0"/>
+          <a:chOff x="0" y="0"/>
+          <a:chExt cx="0" cy="0"/>
+        </a:xfrm>
+      </p:grpSpPr>
+      <p:sp>
+        <p:nvSpPr>
+          <p:cNvPr id="2" name="Título 1">
+            <a:extLst>
+              <a:ext uri="{FF2B5EF4-FFF2-40B4-BE49-F238E27FC236}">
+                <a16:creationId xmlns:a16="http://schemas.microsoft.com/office/drawing/2014/main" id="{8C4C1FD6-2651-4A49-BC34-49B4DAC25CC0}"/>
+              </a:ext>
+            </a:extLst>
+          </p:cNvPr>
+          <p:cNvSpPr>
+            <a:spLocks noGrp="1"/>
+          </p:cNvSpPr>
+          <p:nvPr>
+            <p:ph type="title"/>
+          </p:nvPr>
+        </p:nvSpPr>
+        <p:spPr/>
+        <p:txBody>
+          <a:bodyPr/>
+          <a:lstStyle/>
+          <a:p>
+            <a:endParaRPr lang="pt-BR"/>
+          </a:p>
+        </p:txBody>
+      </p:sp>
+      <p:pic>
+        <p:nvPicPr>
+          <p:cNvPr id="5" name="Espaço Reservado para Conteúdo 4" descr="Uma imagem contendo Forma&#10;&#10;Descrição gerada automaticamente">
+            <a:extLst>
+              <a:ext uri="{FF2B5EF4-FFF2-40B4-BE49-F238E27FC236}">
+                <a16:creationId xmlns:a16="http://schemas.microsoft.com/office/drawing/2014/main" id="{063AF8A2-E168-478F-AC84-F9ABE5A01CD2}"/>
+              </a:ext>
+            </a:extLst>
+          </p:cNvPr>
+          <p:cNvPicPr>
+            <a:picLocks noGrp="1" noChangeAspect="1"/>
+          </p:cNvPicPr>
+          <p:nvPr>
+            <p:ph idx="1"/>
+          </p:nvPr>
+        </p:nvPicPr>
+        <p:blipFill>
+          <a:blip r:embed="rId2">
+            <a:extLst>
+              <a:ext uri="{28A0092B-C50C-407E-A947-70E740481C1C}">
+                <a14:useLocalDpi xmlns:a14="http://schemas.microsoft.com/office/drawing/2010/main" val="0"/>
+              </a:ext>
+            </a:extLst>
+          </a:blip>
+          <a:stretch>
+            <a:fillRect/>
+          </a:stretch>
+        </p:blipFill>
+        <p:spPr>
+          <a:xfrm>
+            <a:off x="0" y="0"/>
+            <a:ext cx="12192000" cy="6858000"/>
+          </a:xfrm>
+        </p:spPr>
+      </p:pic>
+    </p:spTree>
+    <p:extLst>
+      <p:ext uri="{BB962C8B-B14F-4D97-AF65-F5344CB8AC3E}">
+        <p14:creationId xmlns:p14="http://schemas.microsoft.com/office/powerpoint/2010/main" val="1496595329"/>
+      </p:ext>
+    </p:extLst>
+  </p:cSld>
+  <p:clrMapOvr>
+    <a:masterClrMapping/>
+  </p:clrMapOvr>
+</p:sld>
+</file>
+
+<file path=ppt/slides/slide14.xml><?xml version="1.0" encoding="utf-8"?>
+<p:sld xmlns:a="http://schemas.openxmlformats.org/drawingml/2006/main" xmlns:r="http://schemas.openxmlformats.org/officeDocument/2006/relationships" xmlns:p="http://schemas.openxmlformats.org/presentationml/2006/main">
+  <p:cSld>
     <p:spTree>
       <p:nvGrpSpPr>
         <p:cNvPr id="1" name=""/>
@@ -3702,6 +4563,14 @@
 <file path=ppt/slides/slide4.xml><?xml version="1.0" encoding="utf-8"?>
 <p:sld xmlns:a="http://schemas.openxmlformats.org/drawingml/2006/main" xmlns:r="http://schemas.openxmlformats.org/officeDocument/2006/relationships" xmlns:p="http://schemas.openxmlformats.org/presentationml/2006/main">
   <p:cSld>
+    <p:bg>
+      <p:bgPr>
+        <a:solidFill>
+          <a:schemeClr val="bg1"/>
+        </a:solidFill>
+        <a:effectLst/>
+      </p:bgPr>
+    </p:bg>
     <p:spTree>
       <p:nvGrpSpPr>
         <p:cNvPr id="1" name=""/>
@@ -3718,35 +4587,165 @@
       </p:grpSpPr>
       <p:sp>
         <p:nvSpPr>
-          <p:cNvPr id="2" name="Título 1">
-            <a:extLst>
-              <a:ext uri="{FF2B5EF4-FFF2-40B4-BE49-F238E27FC236}">
-                <a16:creationId xmlns:a16="http://schemas.microsoft.com/office/drawing/2014/main" id="{34ABB994-AC9B-43FC-8951-970D552E0D96}"/>
-              </a:ext>
-            </a:extLst>
-          </p:cNvPr>
-          <p:cNvSpPr>
-            <a:spLocks noGrp="1"/>
-          </p:cNvSpPr>
-          <p:nvPr>
-            <p:ph type="title"/>
-          </p:nvPr>
-        </p:nvSpPr>
-        <p:spPr/>
-        <p:txBody>
-          <a:bodyPr/>
-          <a:lstStyle/>
-          <a:p>
-            <a:endParaRPr lang="pt-BR"/>
+          <p:cNvPr id="10" name="Rectangle 9">
+            <a:extLst>
+              <a:ext uri="{FF2B5EF4-FFF2-40B4-BE49-F238E27FC236}">
+                <a16:creationId xmlns:a16="http://schemas.microsoft.com/office/drawing/2014/main" id="{42A4FC2C-047E-45A5-965D-8E1E3BF09BC6}"/>
+              </a:ext>
+              <a:ext uri="{C183D7F6-B498-43B3-948B-1728B52AA6E4}">
+                <adec:decorative xmlns:adec="http://schemas.microsoft.com/office/drawing/2017/decorative" val="1"/>
+              </a:ext>
+            </a:extLst>
+          </p:cNvPr>
+          <p:cNvSpPr>
+            <a:spLocks noGrp="1" noRot="1" noChangeAspect="1" noMove="1" noResize="1" noEditPoints="1" noAdjustHandles="1" noChangeArrowheads="1" noChangeShapeType="1" noTextEdit="1"/>
+          </p:cNvSpPr>
+          <p:nvPr>
+            <p:extLst>
+              <p:ext uri="{386F3935-93C4-4BCD-93E2-E3B085C9AB24}">
+                <p16:designElem xmlns:p16="http://schemas.microsoft.com/office/powerpoint/2015/main" val="1"/>
+              </p:ext>
+            </p:extLst>
+          </p:nvPr>
+        </p:nvSpPr>
+        <p:spPr bwMode="white">
+          <a:xfrm>
+            <a:off x="1524" y="0"/>
+            <a:ext cx="12188952" cy="6858000"/>
+          </a:xfrm>
+          <a:prstGeom prst="rect">
+            <a:avLst/>
+          </a:prstGeom>
+          <a:noFill/>
+          <a:ln>
+            <a:noFill/>
+          </a:ln>
+        </p:spPr>
+        <p:style>
+          <a:lnRef idx="2">
+            <a:schemeClr val="accent1">
+              <a:shade val="50000"/>
+            </a:schemeClr>
+          </a:lnRef>
+          <a:fillRef idx="1">
+            <a:schemeClr val="accent1"/>
+          </a:fillRef>
+          <a:effectRef idx="0">
+            <a:schemeClr val="accent1"/>
+          </a:effectRef>
+          <a:fontRef idx="minor">
+            <a:schemeClr val="lt1"/>
+          </a:fontRef>
+        </p:style>
+        <p:txBody>
+          <a:bodyPr rtlCol="0" anchor="ctr"/>
+          <a:lstStyle>
+            <a:defPPr>
+              <a:defRPr lang="en-US"/>
+            </a:defPPr>
+            <a:lvl1pPr marL="0" algn="l" defTabSz="914400" rtl="0" eaLnBrk="1" latinLnBrk="0" hangingPunct="1">
+              <a:defRPr sz="1800" kern="1200">
+                <a:solidFill>
+                  <a:schemeClr val="lt1"/>
+                </a:solidFill>
+                <a:latin typeface="+mn-lt"/>
+                <a:ea typeface="+mn-ea"/>
+                <a:cs typeface="+mn-cs"/>
+              </a:defRPr>
+            </a:lvl1pPr>
+            <a:lvl2pPr marL="457200" algn="l" defTabSz="914400" rtl="0" eaLnBrk="1" latinLnBrk="0" hangingPunct="1">
+              <a:defRPr sz="1800" kern="1200">
+                <a:solidFill>
+                  <a:schemeClr val="lt1"/>
+                </a:solidFill>
+                <a:latin typeface="+mn-lt"/>
+                <a:ea typeface="+mn-ea"/>
+                <a:cs typeface="+mn-cs"/>
+              </a:defRPr>
+            </a:lvl2pPr>
+            <a:lvl3pPr marL="914400" algn="l" defTabSz="914400" rtl="0" eaLnBrk="1" latinLnBrk="0" hangingPunct="1">
+              <a:defRPr sz="1800" kern="1200">
+                <a:solidFill>
+                  <a:schemeClr val="lt1"/>
+                </a:solidFill>
+                <a:latin typeface="+mn-lt"/>
+                <a:ea typeface="+mn-ea"/>
+                <a:cs typeface="+mn-cs"/>
+              </a:defRPr>
+            </a:lvl3pPr>
+            <a:lvl4pPr marL="1371600" algn="l" defTabSz="914400" rtl="0" eaLnBrk="1" latinLnBrk="0" hangingPunct="1">
+              <a:defRPr sz="1800" kern="1200">
+                <a:solidFill>
+                  <a:schemeClr val="lt1"/>
+                </a:solidFill>
+                <a:latin typeface="+mn-lt"/>
+                <a:ea typeface="+mn-ea"/>
+                <a:cs typeface="+mn-cs"/>
+              </a:defRPr>
+            </a:lvl4pPr>
+            <a:lvl5pPr marL="1828800" algn="l" defTabSz="914400" rtl="0" eaLnBrk="1" latinLnBrk="0" hangingPunct="1">
+              <a:defRPr sz="1800" kern="1200">
+                <a:solidFill>
+                  <a:schemeClr val="lt1"/>
+                </a:solidFill>
+                <a:latin typeface="+mn-lt"/>
+                <a:ea typeface="+mn-ea"/>
+                <a:cs typeface="+mn-cs"/>
+              </a:defRPr>
+            </a:lvl5pPr>
+            <a:lvl6pPr marL="2286000" algn="l" defTabSz="914400" rtl="0" eaLnBrk="1" latinLnBrk="0" hangingPunct="1">
+              <a:defRPr sz="1800" kern="1200">
+                <a:solidFill>
+                  <a:schemeClr val="lt1"/>
+                </a:solidFill>
+                <a:latin typeface="+mn-lt"/>
+                <a:ea typeface="+mn-ea"/>
+                <a:cs typeface="+mn-cs"/>
+              </a:defRPr>
+            </a:lvl6pPr>
+            <a:lvl7pPr marL="2743200" algn="l" defTabSz="914400" rtl="0" eaLnBrk="1" latinLnBrk="0" hangingPunct="1">
+              <a:defRPr sz="1800" kern="1200">
+                <a:solidFill>
+                  <a:schemeClr val="lt1"/>
+                </a:solidFill>
+                <a:latin typeface="+mn-lt"/>
+                <a:ea typeface="+mn-ea"/>
+                <a:cs typeface="+mn-cs"/>
+              </a:defRPr>
+            </a:lvl7pPr>
+            <a:lvl8pPr marL="3200400" algn="l" defTabSz="914400" rtl="0" eaLnBrk="1" latinLnBrk="0" hangingPunct="1">
+              <a:defRPr sz="1800" kern="1200">
+                <a:solidFill>
+                  <a:schemeClr val="lt1"/>
+                </a:solidFill>
+                <a:latin typeface="+mn-lt"/>
+                <a:ea typeface="+mn-ea"/>
+                <a:cs typeface="+mn-cs"/>
+              </a:defRPr>
+            </a:lvl8pPr>
+            <a:lvl9pPr marL="3657600" algn="l" defTabSz="914400" rtl="0" eaLnBrk="1" latinLnBrk="0" hangingPunct="1">
+              <a:defRPr sz="1800" kern="1200">
+                <a:solidFill>
+                  <a:schemeClr val="lt1"/>
+                </a:solidFill>
+                <a:latin typeface="+mn-lt"/>
+                <a:ea typeface="+mn-ea"/>
+                <a:cs typeface="+mn-cs"/>
+              </a:defRPr>
+            </a:lvl9pPr>
+          </a:lstStyle>
+          <a:p>
+            <a:pPr algn="ctr"/>
+            <a:endParaRPr lang="en-US"/>
           </a:p>
         </p:txBody>
       </p:sp>
       <p:pic>
         <p:nvPicPr>
-          <p:cNvPr id="5" name="Espaço Reservado para Conteúdo 4" descr="Linha do tempo&#10;&#10;Descrição gerada automaticamente">
-            <a:extLst>
-              <a:ext uri="{FF2B5EF4-FFF2-40B4-BE49-F238E27FC236}">
-                <a16:creationId xmlns:a16="http://schemas.microsoft.com/office/drawing/2014/main" id="{533CCCA9-0800-486C-8C17-16387C6F0664}"/>
+          <p:cNvPr id="5" name="Espaço Reservado para Conteúdo 4" descr="Uma imagem contendo Diagrama&#10;&#10;Descrição gerada automaticamente">
+            <a:extLst>
+              <a:ext uri="{FF2B5EF4-FFF2-40B4-BE49-F238E27FC236}">
+                <a16:creationId xmlns:a16="http://schemas.microsoft.com/office/drawing/2014/main" id="{91973478-B4B7-41E6-899E-7234C3225AF5}"/>
               </a:ext>
             </a:extLst>
           </p:cNvPr>
@@ -3757,7 +4756,7 @@
             <p:ph idx="1"/>
           </p:nvPr>
         </p:nvPicPr>
-        <p:blipFill>
+        <p:blipFill rotWithShape="1">
           <a:blip r:embed="rId2">
             <a:extLst>
               <a:ext uri="{28A0092B-C50C-407E-A947-70E740481C1C}">
@@ -3765,21 +4764,23 @@
               </a:ext>
             </a:extLst>
           </a:blip>
-          <a:stretch>
-            <a:fillRect/>
-          </a:stretch>
+          <a:srcRect b="19"/>
+          <a:stretch/>
         </p:blipFill>
         <p:spPr>
           <a:xfrm>
-            <a:off x="0" y="0"/>
-            <a:ext cx="12192000" cy="6858000"/>
+            <a:off x="20" y="1282"/>
+            <a:ext cx="12191980" cy="6856718"/>
           </a:xfrm>
+          <a:prstGeom prst="rect">
+            <a:avLst/>
+          </a:prstGeom>
         </p:spPr>
       </p:pic>
     </p:spTree>
     <p:extLst>
       <p:ext uri="{BB962C8B-B14F-4D97-AF65-F5344CB8AC3E}">
-        <p14:creationId xmlns:p14="http://schemas.microsoft.com/office/powerpoint/2010/main" val="1778962453"/>
+        <p14:creationId xmlns:p14="http://schemas.microsoft.com/office/powerpoint/2010/main" val="1367184292"/>
       </p:ext>
     </p:extLst>
   </p:cSld>
@@ -3792,6 +4793,14 @@
 <file path=ppt/slides/slide5.xml><?xml version="1.0" encoding="utf-8"?>
 <p:sld xmlns:a="http://schemas.openxmlformats.org/drawingml/2006/main" xmlns:r="http://schemas.openxmlformats.org/officeDocument/2006/relationships" xmlns:p="http://schemas.openxmlformats.org/presentationml/2006/main">
   <p:cSld>
+    <p:bg>
+      <p:bgPr>
+        <a:solidFill>
+          <a:schemeClr val="bg1"/>
+        </a:solidFill>
+        <a:effectLst/>
+      </p:bgPr>
+    </p:bg>
     <p:spTree>
       <p:nvGrpSpPr>
         <p:cNvPr id="1" name=""/>
@@ -3808,35 +4817,165 @@
       </p:grpSpPr>
       <p:sp>
         <p:nvSpPr>
-          <p:cNvPr id="2" name="Título 1">
-            <a:extLst>
-              <a:ext uri="{FF2B5EF4-FFF2-40B4-BE49-F238E27FC236}">
-                <a16:creationId xmlns:a16="http://schemas.microsoft.com/office/drawing/2014/main" id="{9BE923C6-D497-4FCB-995A-B37A226D37F1}"/>
-              </a:ext>
-            </a:extLst>
-          </p:cNvPr>
-          <p:cNvSpPr>
-            <a:spLocks noGrp="1"/>
-          </p:cNvSpPr>
-          <p:nvPr>
-            <p:ph type="title"/>
-          </p:nvPr>
-        </p:nvSpPr>
-        <p:spPr/>
-        <p:txBody>
-          <a:bodyPr/>
-          <a:lstStyle/>
-          <a:p>
-            <a:endParaRPr lang="pt-BR"/>
+          <p:cNvPr id="10" name="Rectangle 9">
+            <a:extLst>
+              <a:ext uri="{FF2B5EF4-FFF2-40B4-BE49-F238E27FC236}">
+                <a16:creationId xmlns:a16="http://schemas.microsoft.com/office/drawing/2014/main" id="{42A4FC2C-047E-45A5-965D-8E1E3BF09BC6}"/>
+              </a:ext>
+              <a:ext uri="{C183D7F6-B498-43B3-948B-1728B52AA6E4}">
+                <adec:decorative xmlns:adec="http://schemas.microsoft.com/office/drawing/2017/decorative" val="1"/>
+              </a:ext>
+            </a:extLst>
+          </p:cNvPr>
+          <p:cNvSpPr>
+            <a:spLocks noGrp="1" noRot="1" noChangeAspect="1" noMove="1" noResize="1" noEditPoints="1" noAdjustHandles="1" noChangeArrowheads="1" noChangeShapeType="1" noTextEdit="1"/>
+          </p:cNvSpPr>
+          <p:nvPr>
+            <p:extLst>
+              <p:ext uri="{386F3935-93C4-4BCD-93E2-E3B085C9AB24}">
+                <p16:designElem xmlns:p16="http://schemas.microsoft.com/office/powerpoint/2015/main" val="1"/>
+              </p:ext>
+            </p:extLst>
+          </p:nvPr>
+        </p:nvSpPr>
+        <p:spPr bwMode="white">
+          <a:xfrm>
+            <a:off x="1524" y="0"/>
+            <a:ext cx="12188952" cy="6858000"/>
+          </a:xfrm>
+          <a:prstGeom prst="rect">
+            <a:avLst/>
+          </a:prstGeom>
+          <a:noFill/>
+          <a:ln>
+            <a:noFill/>
+          </a:ln>
+        </p:spPr>
+        <p:style>
+          <a:lnRef idx="2">
+            <a:schemeClr val="accent1">
+              <a:shade val="50000"/>
+            </a:schemeClr>
+          </a:lnRef>
+          <a:fillRef idx="1">
+            <a:schemeClr val="accent1"/>
+          </a:fillRef>
+          <a:effectRef idx="0">
+            <a:schemeClr val="accent1"/>
+          </a:effectRef>
+          <a:fontRef idx="minor">
+            <a:schemeClr val="lt1"/>
+          </a:fontRef>
+        </p:style>
+        <p:txBody>
+          <a:bodyPr rtlCol="0" anchor="ctr"/>
+          <a:lstStyle>
+            <a:defPPr>
+              <a:defRPr lang="en-US"/>
+            </a:defPPr>
+            <a:lvl1pPr marL="0" algn="l" defTabSz="914400" rtl="0" eaLnBrk="1" latinLnBrk="0" hangingPunct="1">
+              <a:defRPr sz="1800" kern="1200">
+                <a:solidFill>
+                  <a:schemeClr val="lt1"/>
+                </a:solidFill>
+                <a:latin typeface="+mn-lt"/>
+                <a:ea typeface="+mn-ea"/>
+                <a:cs typeface="+mn-cs"/>
+              </a:defRPr>
+            </a:lvl1pPr>
+            <a:lvl2pPr marL="457200" algn="l" defTabSz="914400" rtl="0" eaLnBrk="1" latinLnBrk="0" hangingPunct="1">
+              <a:defRPr sz="1800" kern="1200">
+                <a:solidFill>
+                  <a:schemeClr val="lt1"/>
+                </a:solidFill>
+                <a:latin typeface="+mn-lt"/>
+                <a:ea typeface="+mn-ea"/>
+                <a:cs typeface="+mn-cs"/>
+              </a:defRPr>
+            </a:lvl2pPr>
+            <a:lvl3pPr marL="914400" algn="l" defTabSz="914400" rtl="0" eaLnBrk="1" latinLnBrk="0" hangingPunct="1">
+              <a:defRPr sz="1800" kern="1200">
+                <a:solidFill>
+                  <a:schemeClr val="lt1"/>
+                </a:solidFill>
+                <a:latin typeface="+mn-lt"/>
+                <a:ea typeface="+mn-ea"/>
+                <a:cs typeface="+mn-cs"/>
+              </a:defRPr>
+            </a:lvl3pPr>
+            <a:lvl4pPr marL="1371600" algn="l" defTabSz="914400" rtl="0" eaLnBrk="1" latinLnBrk="0" hangingPunct="1">
+              <a:defRPr sz="1800" kern="1200">
+                <a:solidFill>
+                  <a:schemeClr val="lt1"/>
+                </a:solidFill>
+                <a:latin typeface="+mn-lt"/>
+                <a:ea typeface="+mn-ea"/>
+                <a:cs typeface="+mn-cs"/>
+              </a:defRPr>
+            </a:lvl4pPr>
+            <a:lvl5pPr marL="1828800" algn="l" defTabSz="914400" rtl="0" eaLnBrk="1" latinLnBrk="0" hangingPunct="1">
+              <a:defRPr sz="1800" kern="1200">
+                <a:solidFill>
+                  <a:schemeClr val="lt1"/>
+                </a:solidFill>
+                <a:latin typeface="+mn-lt"/>
+                <a:ea typeface="+mn-ea"/>
+                <a:cs typeface="+mn-cs"/>
+              </a:defRPr>
+            </a:lvl5pPr>
+            <a:lvl6pPr marL="2286000" algn="l" defTabSz="914400" rtl="0" eaLnBrk="1" latinLnBrk="0" hangingPunct="1">
+              <a:defRPr sz="1800" kern="1200">
+                <a:solidFill>
+                  <a:schemeClr val="lt1"/>
+                </a:solidFill>
+                <a:latin typeface="+mn-lt"/>
+                <a:ea typeface="+mn-ea"/>
+                <a:cs typeface="+mn-cs"/>
+              </a:defRPr>
+            </a:lvl6pPr>
+            <a:lvl7pPr marL="2743200" algn="l" defTabSz="914400" rtl="0" eaLnBrk="1" latinLnBrk="0" hangingPunct="1">
+              <a:defRPr sz="1800" kern="1200">
+                <a:solidFill>
+                  <a:schemeClr val="lt1"/>
+                </a:solidFill>
+                <a:latin typeface="+mn-lt"/>
+                <a:ea typeface="+mn-ea"/>
+                <a:cs typeface="+mn-cs"/>
+              </a:defRPr>
+            </a:lvl7pPr>
+            <a:lvl8pPr marL="3200400" algn="l" defTabSz="914400" rtl="0" eaLnBrk="1" latinLnBrk="0" hangingPunct="1">
+              <a:defRPr sz="1800" kern="1200">
+                <a:solidFill>
+                  <a:schemeClr val="lt1"/>
+                </a:solidFill>
+                <a:latin typeface="+mn-lt"/>
+                <a:ea typeface="+mn-ea"/>
+                <a:cs typeface="+mn-cs"/>
+              </a:defRPr>
+            </a:lvl8pPr>
+            <a:lvl9pPr marL="3657600" algn="l" defTabSz="914400" rtl="0" eaLnBrk="1" latinLnBrk="0" hangingPunct="1">
+              <a:defRPr sz="1800" kern="1200">
+                <a:solidFill>
+                  <a:schemeClr val="lt1"/>
+                </a:solidFill>
+                <a:latin typeface="+mn-lt"/>
+                <a:ea typeface="+mn-ea"/>
+                <a:cs typeface="+mn-cs"/>
+              </a:defRPr>
+            </a:lvl9pPr>
+          </a:lstStyle>
+          <a:p>
+            <a:pPr algn="ctr"/>
+            <a:endParaRPr lang="en-US"/>
           </a:p>
         </p:txBody>
       </p:sp>
       <p:pic>
         <p:nvPicPr>
-          <p:cNvPr id="5" name="Espaço Reservado para Conteúdo 4" descr="Texto&#10;&#10;Descrição gerada automaticamente">
-            <a:extLst>
-              <a:ext uri="{FF2B5EF4-FFF2-40B4-BE49-F238E27FC236}">
-                <a16:creationId xmlns:a16="http://schemas.microsoft.com/office/drawing/2014/main" id="{1C1788DF-BC9F-43A0-A93C-50745D8D9AC3}"/>
+          <p:cNvPr id="5" name="Espaço Reservado para Conteúdo 4" descr="Uma imagem contendo Diagrama&#10;&#10;Descrição gerada automaticamente">
+            <a:extLst>
+              <a:ext uri="{FF2B5EF4-FFF2-40B4-BE49-F238E27FC236}">
+                <a16:creationId xmlns:a16="http://schemas.microsoft.com/office/drawing/2014/main" id="{1A6690D6-64AC-4824-8BCF-432684BD020B}"/>
               </a:ext>
             </a:extLst>
           </p:cNvPr>
@@ -3847,7 +4986,7 @@
             <p:ph idx="1"/>
           </p:nvPr>
         </p:nvPicPr>
-        <p:blipFill>
+        <p:blipFill rotWithShape="1">
           <a:blip r:embed="rId2">
             <a:extLst>
               <a:ext uri="{28A0092B-C50C-407E-A947-70E740481C1C}">
@@ -3855,21 +4994,23 @@
               </a:ext>
             </a:extLst>
           </a:blip>
-          <a:stretch>
-            <a:fillRect/>
-          </a:stretch>
+          <a:srcRect b="19"/>
+          <a:stretch/>
         </p:blipFill>
         <p:spPr>
           <a:xfrm>
-            <a:off x="-1" y="106017"/>
-            <a:ext cx="12192001" cy="6858001"/>
+            <a:off x="20" y="1282"/>
+            <a:ext cx="12191980" cy="6856718"/>
           </a:xfrm>
+          <a:prstGeom prst="rect">
+            <a:avLst/>
+          </a:prstGeom>
         </p:spPr>
       </p:pic>
     </p:spTree>
     <p:extLst>
       <p:ext uri="{BB962C8B-B14F-4D97-AF65-F5344CB8AC3E}">
-        <p14:creationId xmlns:p14="http://schemas.microsoft.com/office/powerpoint/2010/main" val="863295723"/>
+        <p14:creationId xmlns:p14="http://schemas.microsoft.com/office/powerpoint/2010/main" val="3824694420"/>
       </p:ext>
     </p:extLst>
   </p:cSld>
@@ -3901,7 +5042,7 @@
           <p:cNvPr id="2" name="Título 1">
             <a:extLst>
               <a:ext uri="{FF2B5EF4-FFF2-40B4-BE49-F238E27FC236}">
-                <a16:creationId xmlns:a16="http://schemas.microsoft.com/office/drawing/2014/main" id="{5C208015-9151-4AEF-9C58-1E5BC2158791}"/>
+                <a16:creationId xmlns:a16="http://schemas.microsoft.com/office/drawing/2014/main" id="{34ABB994-AC9B-43FC-8951-970D552E0D96}"/>
               </a:ext>
             </a:extLst>
           </p:cNvPr>
@@ -3923,10 +5064,10 @@
       </p:sp>
       <p:pic>
         <p:nvPicPr>
-          <p:cNvPr id="5" name="Espaço Reservado para Conteúdo 4" descr="Uma imagem contendo Interface gráfica do usuário&#10;&#10;Descrição gerada automaticamente">
-            <a:extLst>
-              <a:ext uri="{FF2B5EF4-FFF2-40B4-BE49-F238E27FC236}">
-                <a16:creationId xmlns:a16="http://schemas.microsoft.com/office/drawing/2014/main" id="{11B6C76C-D901-4656-A2BB-AE2408099494}"/>
+          <p:cNvPr id="5" name="Espaço Reservado para Conteúdo 4" descr="Linha do tempo&#10;&#10;Descrição gerada automaticamente">
+            <a:extLst>
+              <a:ext uri="{FF2B5EF4-FFF2-40B4-BE49-F238E27FC236}">
+                <a16:creationId xmlns:a16="http://schemas.microsoft.com/office/drawing/2014/main" id="{533CCCA9-0800-486C-8C17-16387C6F0664}"/>
               </a:ext>
             </a:extLst>
           </p:cNvPr>
@@ -3956,46 +5097,10 @@
           </a:xfrm>
         </p:spPr>
       </p:pic>
-      <p:pic>
-        <p:nvPicPr>
-          <p:cNvPr id="7" name="Imagem 6" descr="Diagrama&#10;&#10;Descrição gerada automaticamente">
-            <a:extLst>
-              <a:ext uri="{FF2B5EF4-FFF2-40B4-BE49-F238E27FC236}">
-                <a16:creationId xmlns:a16="http://schemas.microsoft.com/office/drawing/2014/main" id="{6EE8F483-2FC9-4CFD-B338-3D59750B966E}"/>
-              </a:ext>
-            </a:extLst>
-          </p:cNvPr>
-          <p:cNvPicPr>
-            <a:picLocks noChangeAspect="1"/>
-          </p:cNvPicPr>
-          <p:nvPr/>
-        </p:nvPicPr>
-        <p:blipFill>
-          <a:blip r:embed="rId3">
-            <a:extLst>
-              <a:ext uri="{28A0092B-C50C-407E-A947-70E740481C1C}">
-                <a14:useLocalDpi xmlns:a14="http://schemas.microsoft.com/office/drawing/2010/main" val="0"/>
-              </a:ext>
-            </a:extLst>
-          </a:blip>
-          <a:stretch>
-            <a:fillRect/>
-          </a:stretch>
-        </p:blipFill>
-        <p:spPr>
-          <a:xfrm>
-            <a:off x="2785735" y="1300842"/>
-            <a:ext cx="6954510" cy="4945429"/>
-          </a:xfrm>
-          <a:prstGeom prst="rect">
-            <a:avLst/>
-          </a:prstGeom>
-        </p:spPr>
-      </p:pic>
     </p:spTree>
     <p:extLst>
       <p:ext uri="{BB962C8B-B14F-4D97-AF65-F5344CB8AC3E}">
-        <p14:creationId xmlns:p14="http://schemas.microsoft.com/office/powerpoint/2010/main" val="3406340531"/>
+        <p14:creationId xmlns:p14="http://schemas.microsoft.com/office/powerpoint/2010/main" val="1778962453"/>
       </p:ext>
     </p:extLst>
   </p:cSld>
@@ -4027,7 +5132,7 @@
           <p:cNvPr id="2" name="Título 1">
             <a:extLst>
               <a:ext uri="{FF2B5EF4-FFF2-40B4-BE49-F238E27FC236}">
-                <a16:creationId xmlns:a16="http://schemas.microsoft.com/office/drawing/2014/main" id="{F5E7CE71-8B3E-432E-B0FA-570F79ECC60D}"/>
+                <a16:creationId xmlns:a16="http://schemas.microsoft.com/office/drawing/2014/main" id="{9BE923C6-D497-4FCB-995A-B37A226D37F1}"/>
               </a:ext>
             </a:extLst>
           </p:cNvPr>
@@ -4049,10 +5154,10 @@
       </p:sp>
       <p:pic>
         <p:nvPicPr>
-          <p:cNvPr id="5" name="Espaço Reservado para Conteúdo 4" descr="Uma imagem contendo Logotipo&#10;&#10;Descrição gerada automaticamente">
-            <a:extLst>
-              <a:ext uri="{FF2B5EF4-FFF2-40B4-BE49-F238E27FC236}">
-                <a16:creationId xmlns:a16="http://schemas.microsoft.com/office/drawing/2014/main" id="{772FDBC0-3E9E-416D-ADE2-E79F2C5F27D3}"/>
+          <p:cNvPr id="5" name="Espaço Reservado para Conteúdo 4" descr="Texto&#10;&#10;Descrição gerada automaticamente">
+            <a:extLst>
+              <a:ext uri="{FF2B5EF4-FFF2-40B4-BE49-F238E27FC236}">
+                <a16:creationId xmlns:a16="http://schemas.microsoft.com/office/drawing/2014/main" id="{1C1788DF-BC9F-43A0-A93C-50745D8D9AC3}"/>
               </a:ext>
             </a:extLst>
           </p:cNvPr>
@@ -4077,51 +5182,15 @@
         </p:blipFill>
         <p:spPr>
           <a:xfrm>
-            <a:off x="0" y="0"/>
-            <a:ext cx="12192000" cy="6858000"/>
+            <a:off x="-1" y="106017"/>
+            <a:ext cx="12192001" cy="6858001"/>
           </a:xfrm>
-        </p:spPr>
-      </p:pic>
-      <p:pic>
-        <p:nvPicPr>
-          <p:cNvPr id="7" name="Imagem 6" descr="Diagrama&#10;&#10;Descrição gerada automaticamente">
-            <a:extLst>
-              <a:ext uri="{FF2B5EF4-FFF2-40B4-BE49-F238E27FC236}">
-                <a16:creationId xmlns:a16="http://schemas.microsoft.com/office/drawing/2014/main" id="{C0A3B32A-A9F4-400D-82AC-BA14CE125489}"/>
-              </a:ext>
-            </a:extLst>
-          </p:cNvPr>
-          <p:cNvPicPr>
-            <a:picLocks noChangeAspect="1"/>
-          </p:cNvPicPr>
-          <p:nvPr/>
-        </p:nvPicPr>
-        <p:blipFill>
-          <a:blip r:embed="rId3">
-            <a:extLst>
-              <a:ext uri="{28A0092B-C50C-407E-A947-70E740481C1C}">
-                <a14:useLocalDpi xmlns:a14="http://schemas.microsoft.com/office/drawing/2010/main" val="0"/>
-              </a:ext>
-            </a:extLst>
-          </a:blip>
-          <a:stretch>
-            <a:fillRect/>
-          </a:stretch>
-        </p:blipFill>
-        <p:spPr>
-          <a:xfrm>
-            <a:off x="2719462" y="1873250"/>
-            <a:ext cx="6753076" cy="4802187"/>
-          </a:xfrm>
-          <a:prstGeom prst="rect">
-            <a:avLst/>
-          </a:prstGeom>
         </p:spPr>
       </p:pic>
     </p:spTree>
     <p:extLst>
       <p:ext uri="{BB962C8B-B14F-4D97-AF65-F5344CB8AC3E}">
-        <p14:creationId xmlns:p14="http://schemas.microsoft.com/office/powerpoint/2010/main" val="1080151867"/>
+        <p14:creationId xmlns:p14="http://schemas.microsoft.com/office/powerpoint/2010/main" val="863295723"/>
       </p:ext>
     </p:extLst>
   </p:cSld>
@@ -4153,7 +5222,7 @@
           <p:cNvPr id="2" name="Título 1">
             <a:extLst>
               <a:ext uri="{FF2B5EF4-FFF2-40B4-BE49-F238E27FC236}">
-                <a16:creationId xmlns:a16="http://schemas.microsoft.com/office/drawing/2014/main" id="{A86DEB94-120B-4709-B3AB-FF1F3ECD029D}"/>
+                <a16:creationId xmlns:a16="http://schemas.microsoft.com/office/drawing/2014/main" id="{5C208015-9151-4AEF-9C58-1E5BC2158791}"/>
               </a:ext>
             </a:extLst>
           </p:cNvPr>
@@ -4175,10 +5244,10 @@
       </p:sp>
       <p:pic>
         <p:nvPicPr>
-          <p:cNvPr id="5" name="Espaço Reservado para Conteúdo 4" descr="Texto, Logotipo, nome da empresa&#10;&#10;Descrição gerada automaticamente">
-            <a:extLst>
-              <a:ext uri="{FF2B5EF4-FFF2-40B4-BE49-F238E27FC236}">
-                <a16:creationId xmlns:a16="http://schemas.microsoft.com/office/drawing/2014/main" id="{438B2FAF-DE8B-4248-8DFC-79ACF3D1EC5A}"/>
+          <p:cNvPr id="5" name="Espaço Reservado para Conteúdo 4" descr="Uma imagem contendo Interface gráfica do usuário&#10;&#10;Descrição gerada automaticamente">
+            <a:extLst>
+              <a:ext uri="{FF2B5EF4-FFF2-40B4-BE49-F238E27FC236}">
+                <a16:creationId xmlns:a16="http://schemas.microsoft.com/office/drawing/2014/main" id="{11B6C76C-D901-4656-A2BB-AE2408099494}"/>
               </a:ext>
             </a:extLst>
           </p:cNvPr>
@@ -4208,10 +5277,46 @@
           </a:xfrm>
         </p:spPr>
       </p:pic>
+      <p:pic>
+        <p:nvPicPr>
+          <p:cNvPr id="4" name="Imagem 3" descr="Diagrama&#10;&#10;Descrição gerada automaticamente">
+            <a:extLst>
+              <a:ext uri="{FF2B5EF4-FFF2-40B4-BE49-F238E27FC236}">
+                <a16:creationId xmlns:a16="http://schemas.microsoft.com/office/drawing/2014/main" id="{56EF061F-E560-472F-8C27-A9EA4C748630}"/>
+              </a:ext>
+            </a:extLst>
+          </p:cNvPr>
+          <p:cNvPicPr>
+            <a:picLocks noChangeAspect="1"/>
+          </p:cNvPicPr>
+          <p:nvPr/>
+        </p:nvPicPr>
+        <p:blipFill>
+          <a:blip r:embed="rId3">
+            <a:extLst>
+              <a:ext uri="{28A0092B-C50C-407E-A947-70E740481C1C}">
+                <a14:useLocalDpi xmlns:a14="http://schemas.microsoft.com/office/drawing/2010/main" val="0"/>
+              </a:ext>
+            </a:extLst>
+          </a:blip>
+          <a:stretch>
+            <a:fillRect/>
+          </a:stretch>
+        </p:blipFill>
+        <p:spPr>
+          <a:xfrm>
+            <a:off x="2294767" y="1086678"/>
+            <a:ext cx="7602465" cy="5406197"/>
+          </a:xfrm>
+          <a:prstGeom prst="rect">
+            <a:avLst/>
+          </a:prstGeom>
+        </p:spPr>
+      </p:pic>
     </p:spTree>
     <p:extLst>
       <p:ext uri="{BB962C8B-B14F-4D97-AF65-F5344CB8AC3E}">
-        <p14:creationId xmlns:p14="http://schemas.microsoft.com/office/powerpoint/2010/main" val="1187616082"/>
+        <p14:creationId xmlns:p14="http://schemas.microsoft.com/office/powerpoint/2010/main" val="3406340531"/>
       </p:ext>
     </p:extLst>
   </p:cSld>
@@ -4243,7 +5348,7 @@
           <p:cNvPr id="2" name="Título 1">
             <a:extLst>
               <a:ext uri="{FF2B5EF4-FFF2-40B4-BE49-F238E27FC236}">
-                <a16:creationId xmlns:a16="http://schemas.microsoft.com/office/drawing/2014/main" id="{8C4C1FD6-2651-4A49-BC34-49B4DAC25CC0}"/>
+                <a16:creationId xmlns:a16="http://schemas.microsoft.com/office/drawing/2014/main" id="{F5E7CE71-8B3E-432E-B0FA-570F79ECC60D}"/>
               </a:ext>
             </a:extLst>
           </p:cNvPr>
@@ -4265,10 +5370,10 @@
       </p:sp>
       <p:pic>
         <p:nvPicPr>
-          <p:cNvPr id="5" name="Espaço Reservado para Conteúdo 4" descr="Uma imagem contendo Forma&#10;&#10;Descrição gerada automaticamente">
-            <a:extLst>
-              <a:ext uri="{FF2B5EF4-FFF2-40B4-BE49-F238E27FC236}">
-                <a16:creationId xmlns:a16="http://schemas.microsoft.com/office/drawing/2014/main" id="{063AF8A2-E168-478F-AC84-F9ABE5A01CD2}"/>
+          <p:cNvPr id="5" name="Espaço Reservado para Conteúdo 4" descr="Uma imagem contendo Logotipo&#10;&#10;Descrição gerada automaticamente">
+            <a:extLst>
+              <a:ext uri="{FF2B5EF4-FFF2-40B4-BE49-F238E27FC236}">
+                <a16:creationId xmlns:a16="http://schemas.microsoft.com/office/drawing/2014/main" id="{772FDBC0-3E9E-416D-ADE2-E79F2C5F27D3}"/>
               </a:ext>
             </a:extLst>
           </p:cNvPr>
@@ -4298,10 +5403,46 @@
           </a:xfrm>
         </p:spPr>
       </p:pic>
+      <p:pic>
+        <p:nvPicPr>
+          <p:cNvPr id="4" name="Imagem 3" descr="Diagrama&#10;&#10;Descrição gerada automaticamente">
+            <a:extLst>
+              <a:ext uri="{FF2B5EF4-FFF2-40B4-BE49-F238E27FC236}">
+                <a16:creationId xmlns:a16="http://schemas.microsoft.com/office/drawing/2014/main" id="{D7260A2D-49F3-4698-BDF2-827D00BF6A9B}"/>
+              </a:ext>
+            </a:extLst>
+          </p:cNvPr>
+          <p:cNvPicPr>
+            <a:picLocks noChangeAspect="1"/>
+          </p:cNvPicPr>
+          <p:nvPr/>
+        </p:nvPicPr>
+        <p:blipFill>
+          <a:blip r:embed="rId3">
+            <a:extLst>
+              <a:ext uri="{28A0092B-C50C-407E-A947-70E740481C1C}">
+                <a14:useLocalDpi xmlns:a14="http://schemas.microsoft.com/office/drawing/2010/main" val="0"/>
+              </a:ext>
+            </a:extLst>
+          </a:blip>
+          <a:stretch>
+            <a:fillRect/>
+          </a:stretch>
+        </p:blipFill>
+        <p:spPr>
+          <a:xfrm>
+            <a:off x="2719462" y="1873250"/>
+            <a:ext cx="6753076" cy="4802187"/>
+          </a:xfrm>
+          <a:prstGeom prst="rect">
+            <a:avLst/>
+          </a:prstGeom>
+        </p:spPr>
+      </p:pic>
     </p:spTree>
     <p:extLst>
       <p:ext uri="{BB962C8B-B14F-4D97-AF65-F5344CB8AC3E}">
-        <p14:creationId xmlns:p14="http://schemas.microsoft.com/office/powerpoint/2010/main" val="1496595329"/>
+        <p14:creationId xmlns:p14="http://schemas.microsoft.com/office/powerpoint/2010/main" val="1080151867"/>
       </p:ext>
     </p:extLst>
   </p:cSld>

</xml_diff>